<commit_message>
Deployed 177b723 with MkDocs version: 0.17.5
</commit_message>
<xml_diff>
--- a/materials/day1/files/osgus19-day1-part3-matching-handling.pptx
+++ b/materials/day1/files/osgus19-day1-part3-matching-handling.pptx
@@ -246,7 +246,7 @@
           <a:p>
             <a:fld id="{4A38FD98-208E-E145-8F7D-F85DA493BADA}" type="datetimeFigureOut">
               <a:rPr lang="en-US" smtClean="0"/>
-              <a:t>7/7/19</a:t>
+              <a:t>7/15/19</a:t>
             </a:fld>
             <a:endParaRPr lang="en-US"/>
           </a:p>
@@ -412,7 +412,7 @@
           <a:p>
             <a:fld id="{8BB69F17-669B-A24E-B7C4-DDEEC513615F}" type="datetimeFigureOut">
               <a:rPr lang="en-US" smtClean="0"/>
-              <a:t>7/7/19</a:t>
+              <a:t>7/15/19</a:t>
             </a:fld>
             <a:endParaRPr lang="en-US"/>
           </a:p>
@@ -816,14 +816,14 @@
           </a:ln>
           <a:extLst>
             <a:ext uri="{909E8E84-426E-40dd-AFC4-6F175D3DCCD1}">
-              <a14:hiddenFill xmlns:a14="http://schemas.microsoft.com/office/drawing/2010/main" xmlns="">
+              <a14:hiddenFill xmlns="" xmlns:a14="http://schemas.microsoft.com/office/drawing/2010/main">
                 <a:solidFill>
                   <a:srgbClr val="FFFFFF"/>
                 </a:solidFill>
               </a14:hiddenFill>
             </a:ext>
             <a:ext uri="{91240B29-F687-4f45-9708-019B960494DF}">
-              <a14:hiddenLine xmlns:a14="http://schemas.microsoft.com/office/drawing/2010/main" xmlns="" w="9525">
+              <a14:hiddenLine xmlns="" xmlns:a14="http://schemas.microsoft.com/office/drawing/2010/main" w="9525">
                 <a:solidFill>
                   <a:srgbClr val="000000"/>
                 </a:solidFill>
@@ -2824,17 +2824,17 @@
           </a:ln>
           <a:extLst>
             <a:ext uri="{FAA26D3D-D897-4be2-8F04-BA451C77F1D7}">
-              <ma14:placeholderFlag xmlns:ma14="http://schemas.microsoft.com/office/mac/drawingml/2011/main" xmlns="" val="1"/>
+              <ma14:placeholderFlag xmlns="" xmlns:ma14="http://schemas.microsoft.com/office/mac/drawingml/2011/main" val="1"/>
             </a:ext>
             <a:ext uri="{909E8E84-426E-40dd-AFC4-6F175D3DCCD1}">
-              <a14:hiddenFill xmlns:a14="http://schemas.microsoft.com/office/drawing/2010/main" xmlns="">
+              <a14:hiddenFill xmlns="" xmlns:a14="http://schemas.microsoft.com/office/drawing/2010/main">
                 <a:solidFill>
                   <a:srgbClr val="FFFFFF"/>
                 </a:solidFill>
               </a14:hiddenFill>
             </a:ext>
             <a:ext uri="{91240B29-F687-4f45-9708-019B960494DF}">
-              <a14:hiddenLine xmlns:a14="http://schemas.microsoft.com/office/drawing/2010/main" xmlns="" w="9525">
+              <a14:hiddenLine xmlns="" xmlns:a14="http://schemas.microsoft.com/office/drawing/2010/main" w="9525">
                 <a:solidFill>
                   <a:srgbClr val="000000"/>
                 </a:solidFill>
@@ -2885,17 +2885,17 @@
           </a:ln>
           <a:extLst>
             <a:ext uri="{FAA26D3D-D897-4be2-8F04-BA451C77F1D7}">
-              <ma14:placeholderFlag xmlns:ma14="http://schemas.microsoft.com/office/mac/drawingml/2011/main" xmlns="" val="1"/>
+              <ma14:placeholderFlag xmlns="" xmlns:ma14="http://schemas.microsoft.com/office/mac/drawingml/2011/main" val="1"/>
             </a:ext>
             <a:ext uri="{909E8E84-426E-40dd-AFC4-6F175D3DCCD1}">
-              <a14:hiddenFill xmlns:a14="http://schemas.microsoft.com/office/drawing/2010/main" xmlns="">
+              <a14:hiddenFill xmlns="" xmlns:a14="http://schemas.microsoft.com/office/drawing/2010/main">
                 <a:solidFill>
                   <a:srgbClr val="FFFFFF"/>
                 </a:solidFill>
               </a14:hiddenFill>
             </a:ext>
             <a:ext uri="{91240B29-F687-4f45-9708-019B960494DF}">
-              <a14:hiddenLine xmlns:a14="http://schemas.microsoft.com/office/drawing/2010/main" xmlns="" w="9525">
+              <a14:hiddenLine xmlns="" xmlns:a14="http://schemas.microsoft.com/office/drawing/2010/main" w="9525">
                 <a:solidFill>
                   <a:srgbClr val="000000"/>
                 </a:solidFill>
@@ -2972,14 +2972,14 @@
           </a:ln>
           <a:extLst>
             <a:ext uri="{909E8E84-426E-40dd-AFC4-6F175D3DCCD1}">
-              <a14:hiddenFill xmlns:a14="http://schemas.microsoft.com/office/drawing/2010/main" xmlns="">
+              <a14:hiddenFill xmlns="" xmlns:a14="http://schemas.microsoft.com/office/drawing/2010/main">
                 <a:solidFill>
                   <a:srgbClr val="FFFFFF"/>
                 </a:solidFill>
               </a14:hiddenFill>
             </a:ext>
             <a:ext uri="{91240B29-F687-4f45-9708-019B960494DF}">
-              <a14:hiddenLine xmlns:a14="http://schemas.microsoft.com/office/drawing/2010/main" xmlns="" w="9525">
+              <a14:hiddenLine xmlns="" xmlns:a14="http://schemas.microsoft.com/office/drawing/2010/main" w="9525">
                 <a:solidFill>
                   <a:srgbClr val="000000"/>
                 </a:solidFill>
@@ -3216,14 +3216,14 @@
           </a:ln>
           <a:extLst>
             <a:ext uri="{909E8E84-426E-40dd-AFC4-6F175D3DCCD1}">
-              <a14:hiddenFill xmlns:a14="http://schemas.microsoft.com/office/drawing/2010/main" xmlns="">
+              <a14:hiddenFill xmlns="" xmlns:a14="http://schemas.microsoft.com/office/drawing/2010/main">
                 <a:solidFill>
                   <a:srgbClr val="FFFFFF"/>
                 </a:solidFill>
               </a14:hiddenFill>
             </a:ext>
             <a:ext uri="{91240B29-F687-4f45-9708-019B960494DF}">
-              <a14:hiddenLine xmlns:a14="http://schemas.microsoft.com/office/drawing/2010/main" xmlns="" w="9525">
+              <a14:hiddenLine xmlns="" xmlns:a14="http://schemas.microsoft.com/office/drawing/2010/main" w="9525">
                 <a:solidFill>
                   <a:srgbClr val="000000"/>
                 </a:solidFill>
@@ -3257,14 +3257,14 @@
           </a:ln>
           <a:extLst>
             <a:ext uri="{909E8E84-426E-40dd-AFC4-6F175D3DCCD1}">
-              <a14:hiddenFill xmlns:a14="http://schemas.microsoft.com/office/drawing/2010/main" xmlns="">
+              <a14:hiddenFill xmlns="" xmlns:a14="http://schemas.microsoft.com/office/drawing/2010/main">
                 <a:solidFill>
                   <a:srgbClr val="FFFFFF"/>
                 </a:solidFill>
               </a14:hiddenFill>
             </a:ext>
             <a:ext uri="{91240B29-F687-4f45-9708-019B960494DF}">
-              <a14:hiddenLine xmlns:a14="http://schemas.microsoft.com/office/drawing/2010/main" xmlns="" w="9525">
+              <a14:hiddenLine xmlns="" xmlns:a14="http://schemas.microsoft.com/office/drawing/2010/main" w="9525">
                 <a:solidFill>
                   <a:srgbClr val="000000"/>
                 </a:solidFill>
@@ -3436,7 +3436,7 @@
           </a:ln>
           <a:extLst>
             <a:ext uri="{909E8E84-426E-40dd-AFC4-6F175D3DCCD1}">
-              <a14:hiddenFill xmlns:a14="http://schemas.microsoft.com/office/drawing/2010/main" xmlns="">
+              <a14:hiddenFill xmlns="" xmlns:a14="http://schemas.microsoft.com/office/drawing/2010/main">
                 <a:noFill/>
               </a14:hiddenFill>
             </a:ext>
@@ -12494,7 +12494,7 @@
           <a:p>
             <a:r>
               <a:rPr lang="en-US" sz="2800" dirty="0"/>
-              <a:t>Check out the Intro to HTCondor talk from HTCondor Week 2017 for more on:</a:t>
+              <a:t>Check out the Intro to HTCondor talk from HTCondor Week 2019 for more on:</a:t>
             </a:r>
           </a:p>
           <a:p>
@@ -13931,7 +13931,7 @@
             <a:pPr lvl="1"/>
             <a:r>
               <a:rPr lang="en-US" dirty="0"/>
-              <a:t>Runs DAG workflows (next session)</a:t>
+              <a:t>Runs DAG workflows (Thursday)</a:t>
             </a:r>
           </a:p>
           <a:p>
@@ -14253,7 +14253,7 @@
           <a:p>
             <a:r>
               <a:rPr lang="en-US" sz="2400" dirty="0"/>
-              <a:t>See the “Introduction to Using HTCondor” talk from HTCondor Week 2017!!</a:t>
+              <a:t>See the “Introduction to Using HTCondor” talk from HTCondor Week 2019!!</a:t>
             </a:r>
           </a:p>
           <a:p>

</xml_diff>